<commit_message>
made changes to burndown chart and added problems facewd
</commit_message>
<xml_diff>
--- a/Sprint_3.pptx
+++ b/Sprint_3.pptx
@@ -8,7 +8,7 @@
     <p:sldMasterId id="2147483684" r:id="rId4"/>
   </p:sldMasterIdLst>
   <p:notesMasterIdLst>
-    <p:notesMasterId r:id="rId15"/>
+    <p:notesMasterId r:id="rId16"/>
   </p:notesMasterIdLst>
   <p:sldIdLst>
     <p:sldId id="259" r:id="rId5"/>
@@ -16,11 +16,12 @@
     <p:sldId id="256" r:id="rId7"/>
     <p:sldId id="257" r:id="rId8"/>
     <p:sldId id="258" r:id="rId9"/>
-    <p:sldId id="261" r:id="rId10"/>
-    <p:sldId id="262" r:id="rId11"/>
-    <p:sldId id="263" r:id="rId12"/>
-    <p:sldId id="264" r:id="rId13"/>
-    <p:sldId id="265" r:id="rId14"/>
+    <p:sldId id="266" r:id="rId10"/>
+    <p:sldId id="261" r:id="rId11"/>
+    <p:sldId id="262" r:id="rId12"/>
+    <p:sldId id="263" r:id="rId13"/>
+    <p:sldId id="264" r:id="rId14"/>
+    <p:sldId id="265" r:id="rId15"/>
   </p:sldIdLst>
   <p:sldSz cx="12192000" cy="6858000"/>
   <p:notesSz cx="6858000" cy="9144000"/>
@@ -209,7 +210,7 @@
           <a:p>
             <a:fld id="{DD66414F-45C6-42ED-A067-D87E446B7378}" type="datetimeFigureOut">
               <a:rPr lang="en-US" smtClean="0"/>
-              <a:t>3/14/2016</a:t>
+              <a:t>3/15/2016</a:t>
             </a:fld>
             <a:endParaRPr lang="en-US"/>
           </a:p>
@@ -692,7 +693,7 @@
           <a:p>
             <a:fld id="{F77F7B43-9414-4A33-95F8-147477E5B834}" type="datetimeFigureOut">
               <a:rPr lang="en-US" smtClean="0"/>
-              <a:t>3/14/2016</a:t>
+              <a:t>3/15/2016</a:t>
             </a:fld>
             <a:endParaRPr lang="en-US"/>
           </a:p>
@@ -862,7 +863,7 @@
           <a:p>
             <a:fld id="{F77F7B43-9414-4A33-95F8-147477E5B834}" type="datetimeFigureOut">
               <a:rPr lang="en-US" smtClean="0"/>
-              <a:t>3/14/2016</a:t>
+              <a:t>3/15/2016</a:t>
             </a:fld>
             <a:endParaRPr lang="en-US"/>
           </a:p>
@@ -1042,7 +1043,7 @@
           <a:p>
             <a:fld id="{F77F7B43-9414-4A33-95F8-147477E5B834}" type="datetimeFigureOut">
               <a:rPr lang="en-US" smtClean="0"/>
-              <a:t>3/14/2016</a:t>
+              <a:t>3/15/2016</a:t>
             </a:fld>
             <a:endParaRPr lang="en-US"/>
           </a:p>
@@ -1291,7 +1292,7 @@
                 </a:solidFill>
               </a:rPr>
               <a:pPr/>
-              <a:t>3/14/2016</a:t>
+              <a:t>3/15/2016</a:t>
             </a:fld>
             <a:endParaRPr lang="en-US">
               <a:solidFill>
@@ -1493,7 +1494,7 @@
                 </a:solidFill>
               </a:rPr>
               <a:pPr/>
-              <a:t>3/14/2016</a:t>
+              <a:t>3/15/2016</a:t>
             </a:fld>
             <a:endParaRPr lang="en-US">
               <a:solidFill>
@@ -1771,7 +1772,7 @@
                 </a:solidFill>
               </a:rPr>
               <a:pPr/>
-              <a:t>3/14/2016</a:t>
+              <a:t>3/15/2016</a:t>
             </a:fld>
             <a:endParaRPr lang="en-US">
               <a:solidFill>
@@ -2091,7 +2092,7 @@
                 </a:solidFill>
               </a:rPr>
               <a:pPr/>
-              <a:t>3/14/2016</a:t>
+              <a:t>3/15/2016</a:t>
             </a:fld>
             <a:endParaRPr lang="en-US">
               <a:solidFill>
@@ -2545,7 +2546,7 @@
                 </a:solidFill>
               </a:rPr>
               <a:pPr/>
-              <a:t>3/14/2016</a:t>
+              <a:t>3/15/2016</a:t>
             </a:fld>
             <a:endParaRPr lang="en-US">
               <a:solidFill>
@@ -2695,7 +2696,7 @@
                 </a:solidFill>
               </a:rPr>
               <a:pPr/>
-              <a:t>3/14/2016</a:t>
+              <a:t>3/15/2016</a:t>
             </a:fld>
             <a:endParaRPr lang="en-US">
               <a:solidFill>
@@ -2822,7 +2823,7 @@
                 </a:solidFill>
               </a:rPr>
               <a:pPr/>
-              <a:t>3/14/2016</a:t>
+              <a:t>3/15/2016</a:t>
             </a:fld>
             <a:endParaRPr lang="en-US">
               <a:solidFill>
@@ -3131,7 +3132,7 @@
                 </a:solidFill>
               </a:rPr>
               <a:pPr/>
-              <a:t>3/14/2016</a:t>
+              <a:t>3/15/2016</a:t>
             </a:fld>
             <a:endParaRPr lang="en-US">
               <a:solidFill>
@@ -3326,7 +3327,7 @@
           <a:p>
             <a:fld id="{F77F7B43-9414-4A33-95F8-147477E5B834}" type="datetimeFigureOut">
               <a:rPr lang="en-US" smtClean="0"/>
-              <a:t>3/14/2016</a:t>
+              <a:t>3/15/2016</a:t>
             </a:fld>
             <a:endParaRPr lang="en-US"/>
           </a:p>
@@ -3586,7 +3587,7 @@
                 </a:solidFill>
               </a:rPr>
               <a:pPr/>
-              <a:t>3/14/2016</a:t>
+              <a:t>3/15/2016</a:t>
             </a:fld>
             <a:endParaRPr lang="en-US">
               <a:solidFill>
@@ -3788,7 +3789,7 @@
                 </a:solidFill>
               </a:rPr>
               <a:pPr/>
-              <a:t>3/14/2016</a:t>
+              <a:t>3/15/2016</a:t>
             </a:fld>
             <a:endParaRPr lang="en-US">
               <a:solidFill>
@@ -4000,7 +4001,7 @@
                 </a:solidFill>
               </a:rPr>
               <a:pPr/>
-              <a:t>3/14/2016</a:t>
+              <a:t>3/15/2016</a:t>
             </a:fld>
             <a:endParaRPr lang="en-US">
               <a:solidFill>
@@ -4274,7 +4275,7 @@
                 </a:solidFill>
               </a:rPr>
               <a:pPr/>
-              <a:t>3/14/2016</a:t>
+              <a:t>3/15/2016</a:t>
             </a:fld>
             <a:endParaRPr lang="en-US">
               <a:solidFill>
@@ -4476,7 +4477,7 @@
                 </a:solidFill>
               </a:rPr>
               <a:pPr/>
-              <a:t>3/14/2016</a:t>
+              <a:t>3/15/2016</a:t>
             </a:fld>
             <a:endParaRPr lang="en-US">
               <a:solidFill>
@@ -4754,7 +4755,7 @@
                 </a:solidFill>
               </a:rPr>
               <a:pPr/>
-              <a:t>3/14/2016</a:t>
+              <a:t>3/15/2016</a:t>
             </a:fld>
             <a:endParaRPr lang="en-US">
               <a:solidFill>
@@ -5074,7 +5075,7 @@
                 </a:solidFill>
               </a:rPr>
               <a:pPr/>
-              <a:t>3/14/2016</a:t>
+              <a:t>3/15/2016</a:t>
             </a:fld>
             <a:endParaRPr lang="en-US">
               <a:solidFill>
@@ -5528,7 +5529,7 @@
                 </a:solidFill>
               </a:rPr>
               <a:pPr/>
-              <a:t>3/14/2016</a:t>
+              <a:t>3/15/2016</a:t>
             </a:fld>
             <a:endParaRPr lang="en-US">
               <a:solidFill>
@@ -5678,7 +5679,7 @@
                 </a:solidFill>
               </a:rPr>
               <a:pPr/>
-              <a:t>3/14/2016</a:t>
+              <a:t>3/15/2016</a:t>
             </a:fld>
             <a:endParaRPr lang="en-US">
               <a:solidFill>
@@ -5805,7 +5806,7 @@
                 </a:solidFill>
               </a:rPr>
               <a:pPr/>
-              <a:t>3/14/2016</a:t>
+              <a:t>3/15/2016</a:t>
             </a:fld>
             <a:endParaRPr lang="en-US">
               <a:solidFill>
@@ -6076,7 +6077,7 @@
           <a:p>
             <a:fld id="{F77F7B43-9414-4A33-95F8-147477E5B834}" type="datetimeFigureOut">
               <a:rPr lang="en-US" smtClean="0"/>
-              <a:t>3/14/2016</a:t>
+              <a:t>3/15/2016</a:t>
             </a:fld>
             <a:endParaRPr lang="en-US"/>
           </a:p>
@@ -6360,7 +6361,7 @@
                 </a:solidFill>
               </a:rPr>
               <a:pPr/>
-              <a:t>3/14/2016</a:t>
+              <a:t>3/15/2016</a:t>
             </a:fld>
             <a:endParaRPr lang="en-US">
               <a:solidFill>
@@ -6645,7 +6646,7 @@
                 </a:solidFill>
               </a:rPr>
               <a:pPr/>
-              <a:t>3/14/2016</a:t>
+              <a:t>3/15/2016</a:t>
             </a:fld>
             <a:endParaRPr lang="en-US">
               <a:solidFill>
@@ -6847,7 +6848,7 @@
                 </a:solidFill>
               </a:rPr>
               <a:pPr/>
-              <a:t>3/14/2016</a:t>
+              <a:t>3/15/2016</a:t>
             </a:fld>
             <a:endParaRPr lang="en-US">
               <a:solidFill>
@@ -7059,7 +7060,7 @@
                 </a:solidFill>
               </a:rPr>
               <a:pPr/>
-              <a:t>3/14/2016</a:t>
+              <a:t>3/15/2016</a:t>
             </a:fld>
             <a:endParaRPr lang="en-US">
               <a:solidFill>
@@ -7333,7 +7334,7 @@
                 </a:solidFill>
               </a:rPr>
               <a:pPr/>
-              <a:t>3/14/2016</a:t>
+              <a:t>3/15/2016</a:t>
             </a:fld>
             <a:endParaRPr lang="en-US">
               <a:solidFill>
@@ -7535,7 +7536,7 @@
                 </a:solidFill>
               </a:rPr>
               <a:pPr/>
-              <a:t>3/14/2016</a:t>
+              <a:t>3/15/2016</a:t>
             </a:fld>
             <a:endParaRPr lang="en-US">
               <a:solidFill>
@@ -7813,7 +7814,7 @@
                 </a:solidFill>
               </a:rPr>
               <a:pPr/>
-              <a:t>3/14/2016</a:t>
+              <a:t>3/15/2016</a:t>
             </a:fld>
             <a:endParaRPr lang="en-US">
               <a:solidFill>
@@ -8133,7 +8134,7 @@
                 </a:solidFill>
               </a:rPr>
               <a:pPr/>
-              <a:t>3/14/2016</a:t>
+              <a:t>3/15/2016</a:t>
             </a:fld>
             <a:endParaRPr lang="en-US">
               <a:solidFill>
@@ -8587,7 +8588,7 @@
                 </a:solidFill>
               </a:rPr>
               <a:pPr/>
-              <a:t>3/14/2016</a:t>
+              <a:t>3/15/2016</a:t>
             </a:fld>
             <a:endParaRPr lang="en-US">
               <a:solidFill>
@@ -8737,7 +8738,7 @@
                 </a:solidFill>
               </a:rPr>
               <a:pPr/>
-              <a:t>3/14/2016</a:t>
+              <a:t>3/15/2016</a:t>
             </a:fld>
             <a:endParaRPr lang="en-US">
               <a:solidFill>
@@ -8994,7 +8995,7 @@
           <a:p>
             <a:fld id="{F77F7B43-9414-4A33-95F8-147477E5B834}" type="datetimeFigureOut">
               <a:rPr lang="en-US" smtClean="0"/>
-              <a:t>3/14/2016</a:t>
+              <a:t>3/15/2016</a:t>
             </a:fld>
             <a:endParaRPr lang="en-US"/>
           </a:p>
@@ -9096,7 +9097,7 @@
                 </a:solidFill>
               </a:rPr>
               <a:pPr/>
-              <a:t>3/14/2016</a:t>
+              <a:t>3/15/2016</a:t>
             </a:fld>
             <a:endParaRPr lang="en-US">
               <a:solidFill>
@@ -9405,7 +9406,7 @@
                 </a:solidFill>
               </a:rPr>
               <a:pPr/>
-              <a:t>3/14/2016</a:t>
+              <a:t>3/15/2016</a:t>
             </a:fld>
             <a:endParaRPr lang="en-US">
               <a:solidFill>
@@ -9690,7 +9691,7 @@
                 </a:solidFill>
               </a:rPr>
               <a:pPr/>
-              <a:t>3/14/2016</a:t>
+              <a:t>3/15/2016</a:t>
             </a:fld>
             <a:endParaRPr lang="en-US">
               <a:solidFill>
@@ -9892,7 +9893,7 @@
                 </a:solidFill>
               </a:rPr>
               <a:pPr/>
-              <a:t>3/14/2016</a:t>
+              <a:t>3/15/2016</a:t>
             </a:fld>
             <a:endParaRPr lang="en-US">
               <a:solidFill>
@@ -10104,7 +10105,7 @@
                 </a:solidFill>
               </a:rPr>
               <a:pPr/>
-              <a:t>3/14/2016</a:t>
+              <a:t>3/15/2016</a:t>
             </a:fld>
             <a:endParaRPr lang="en-US">
               <a:solidFill>
@@ -10496,7 +10497,7 @@
           <a:p>
             <a:fld id="{F77F7B43-9414-4A33-95F8-147477E5B834}" type="datetimeFigureOut">
               <a:rPr lang="en-US" smtClean="0"/>
-              <a:t>3/14/2016</a:t>
+              <a:t>3/15/2016</a:t>
             </a:fld>
             <a:endParaRPr lang="en-US"/>
           </a:p>
@@ -10614,7 +10615,7 @@
           <a:p>
             <a:fld id="{F77F7B43-9414-4A33-95F8-147477E5B834}" type="datetimeFigureOut">
               <a:rPr lang="en-US" smtClean="0"/>
-              <a:t>3/14/2016</a:t>
+              <a:t>3/15/2016</a:t>
             </a:fld>
             <a:endParaRPr lang="en-US"/>
           </a:p>
@@ -10709,7 +10710,7 @@
           <a:p>
             <a:fld id="{F77F7B43-9414-4A33-95F8-147477E5B834}" type="datetimeFigureOut">
               <a:rPr lang="en-US" smtClean="0"/>
-              <a:t>3/14/2016</a:t>
+              <a:t>3/15/2016</a:t>
             </a:fld>
             <a:endParaRPr lang="en-US"/>
           </a:p>
@@ -10986,7 +10987,7 @@
           <a:p>
             <a:fld id="{F77F7B43-9414-4A33-95F8-147477E5B834}" type="datetimeFigureOut">
               <a:rPr lang="en-US" smtClean="0"/>
-              <a:t>3/14/2016</a:t>
+              <a:t>3/15/2016</a:t>
             </a:fld>
             <a:endParaRPr lang="en-US"/>
           </a:p>
@@ -11239,7 +11240,7 @@
           <a:p>
             <a:fld id="{F77F7B43-9414-4A33-95F8-147477E5B834}" type="datetimeFigureOut">
               <a:rPr lang="en-US" smtClean="0"/>
-              <a:t>3/14/2016</a:t>
+              <a:t>3/15/2016</a:t>
             </a:fld>
             <a:endParaRPr lang="en-US"/>
           </a:p>
@@ -11452,7 +11453,7 @@
           <a:p>
             <a:fld id="{F77F7B43-9414-4A33-95F8-147477E5B834}" type="datetimeFigureOut">
               <a:rPr lang="en-US" smtClean="0"/>
-              <a:t>3/14/2016</a:t>
+              <a:t>3/15/2016</a:t>
             </a:fld>
             <a:endParaRPr lang="en-US"/>
           </a:p>
@@ -12000,7 +12001,7 @@
                 </a:solidFill>
               </a:rPr>
               <a:pPr defTabSz="457200"/>
-              <a:t>3/14/2016</a:t>
+              <a:t>3/15/2016</a:t>
             </a:fld>
             <a:endParaRPr lang="en-US">
               <a:solidFill>
@@ -12545,7 +12546,7 @@
                 </a:solidFill>
               </a:rPr>
               <a:pPr defTabSz="457200"/>
-              <a:t>3/14/2016</a:t>
+              <a:t>3/15/2016</a:t>
             </a:fld>
             <a:endParaRPr lang="en-US">
               <a:solidFill>
@@ -13090,7 +13091,7 @@
                 </a:solidFill>
               </a:rPr>
               <a:pPr defTabSz="457200"/>
-              <a:t>3/14/2016</a:t>
+              <a:t>3/15/2016</a:t>
             </a:fld>
             <a:endParaRPr lang="en-US">
               <a:solidFill>
@@ -13816,6 +13817,77 @@
                 <a:latin typeface="Times New Roman" panose="02020603050405020304" pitchFamily="18" charset="0"/>
                 <a:cs typeface="Times New Roman" panose="02020603050405020304" pitchFamily="18" charset="0"/>
               </a:rPr>
+              <a:t>Questions?</a:t>
+            </a:r>
+            <a:endParaRPr lang="en-US" b="1" dirty="0">
+              <a:latin typeface="Times New Roman" panose="02020603050405020304" pitchFamily="18" charset="0"/>
+              <a:cs typeface="Times New Roman" panose="02020603050405020304" pitchFamily="18" charset="0"/>
+            </a:endParaRPr>
+          </a:p>
+        </p:txBody>
+      </p:sp>
+    </p:spTree>
+    <p:extLst>
+      <p:ext uri="{BB962C8B-B14F-4D97-AF65-F5344CB8AC3E}">
+        <p14:creationId xmlns:p14="http://schemas.microsoft.com/office/powerpoint/2010/main" val="4022118759"/>
+      </p:ext>
+    </p:extLst>
+  </p:cSld>
+  <p:clrMapOvr>
+    <a:masterClrMapping/>
+  </p:clrMapOvr>
+  <p:timing>
+    <p:tnLst>
+      <p:par>
+        <p:cTn id="1" dur="indefinite" restart="never" nodeType="tmRoot"/>
+      </p:par>
+    </p:tnLst>
+  </p:timing>
+</p:sld>
+</file>
+
+<file path=ppt/slides/slide11.xml><?xml version="1.0" encoding="utf-8"?>
+<p:sld xmlns:a="http://schemas.openxmlformats.org/drawingml/2006/main" xmlns:r="http://schemas.openxmlformats.org/officeDocument/2006/relationships" xmlns:p="http://schemas.openxmlformats.org/presentationml/2006/main">
+  <p:cSld>
+    <p:spTree>
+      <p:nvGrpSpPr>
+        <p:cNvPr id="1" name=""/>
+        <p:cNvGrpSpPr/>
+        <p:nvPr/>
+      </p:nvGrpSpPr>
+      <p:grpSpPr>
+        <a:xfrm>
+          <a:off x="0" y="0"/>
+          <a:ext cx="0" cy="0"/>
+          <a:chOff x="0" y="0"/>
+          <a:chExt cx="0" cy="0"/>
+        </a:xfrm>
+      </p:grpSpPr>
+      <p:sp>
+        <p:nvSpPr>
+          <p:cNvPr id="2" name="Title 1"/>
+          <p:cNvSpPr>
+            <a:spLocks noGrp="1"/>
+          </p:cNvSpPr>
+          <p:nvPr>
+            <p:ph type="title"/>
+          </p:nvPr>
+        </p:nvSpPr>
+        <p:spPr>
+          <a:xfrm>
+            <a:off x="1981200" y="2857500"/>
+            <a:ext cx="8229600" cy="1143000"/>
+          </a:xfrm>
+        </p:spPr>
+        <p:txBody>
+          <a:bodyPr/>
+          <a:lstStyle/>
+          <a:p>
+            <a:r>
+              <a:rPr lang="en-US" b="1" dirty="0" smtClean="0">
+                <a:latin typeface="Times New Roman" panose="02020603050405020304" pitchFamily="18" charset="0"/>
+                <a:cs typeface="Times New Roman" panose="02020603050405020304" pitchFamily="18" charset="0"/>
+              </a:rPr>
               <a:t>Thank You</a:t>
             </a:r>
             <a:endParaRPr lang="en-US" b="1" dirty="0">
@@ -13835,6 +13907,13 @@
   <p:clrMapOvr>
     <a:masterClrMapping/>
   </p:clrMapOvr>
+  <p:timing>
+    <p:tnLst>
+      <p:par>
+        <p:cTn id="1" dur="indefinite" restart="never" nodeType="tmRoot"/>
+      </p:par>
+    </p:tnLst>
+  </p:timing>
 </p:sld>
 </file>
 
@@ -16376,6 +16455,13 @@
   <p:clrMapOvr>
     <a:masterClrMapping/>
   </p:clrMapOvr>
+  <p:timing>
+    <p:tnLst>
+      <p:par>
+        <p:cTn id="1" dur="indefinite" restart="never" nodeType="tmRoot"/>
+      </p:par>
+    </p:tnLst>
+  </p:timing>
 </p:sld>
 </file>
 
@@ -18052,6 +18138,13 @@
   <p:clrMapOvr>
     <a:masterClrMapping/>
   </p:clrMapOvr>
+  <p:timing>
+    <p:tnLst>
+      <p:par>
+        <p:cTn id="1" dur="indefinite" restart="never" nodeType="tmRoot"/>
+      </p:par>
+    </p:tnLst>
+  </p:timing>
 </p:sld>
 </file>
 
@@ -19728,6 +19821,13 @@
   <p:clrMapOvr>
     <a:masterClrMapping/>
   </p:clrMapOvr>
+  <p:timing>
+    <p:tnLst>
+      <p:par>
+        <p:cTn id="1" dur="indefinite" restart="never" nodeType="tmRoot"/>
+      </p:par>
+    </p:tnLst>
+  </p:timing>
 </p:sld>
 </file>
 
@@ -19760,27 +19860,19 @@
         </p:nvSpPr>
         <p:spPr>
           <a:xfrm>
-            <a:off x="0" y="0"/>
-            <a:ext cx="12192000" cy="1143000"/>
-          </a:xfrm>
-        </p:spPr>
-        <p:txBody>
-          <a:bodyPr>
-            <a:normAutofit/>
-          </a:bodyPr>
-          <a:lstStyle/>
-          <a:p>
-            <a:r>
-              <a:rPr lang="en-US" sz="4000" b="1" dirty="0" smtClean="0">
-                <a:latin typeface="Times New Roman"/>
-                <a:cs typeface="Times New Roman"/>
-              </a:rPr>
-              <a:t>Problems Faced</a:t>
-            </a:r>
-            <a:endParaRPr lang="en-US" sz="4000" b="1" dirty="0">
-              <a:latin typeface="Times New Roman"/>
-              <a:cs typeface="Times New Roman"/>
-            </a:endParaRPr>
+            <a:off x="2516688" y="114604"/>
+            <a:ext cx="10515600" cy="1325563"/>
+          </a:xfrm>
+        </p:spPr>
+        <p:txBody>
+          <a:bodyPr/>
+          <a:lstStyle/>
+          <a:p>
+            <a:r>
+              <a:rPr lang="en-US" b="1" dirty="0" smtClean="0"/>
+              <a:t>Problems faced in this Sprint</a:t>
+            </a:r>
+            <a:endParaRPr lang="en-US" b="1" dirty="0"/>
           </a:p>
         </p:txBody>
       </p:sp>
@@ -19792,8 +19884,8 @@
         </p:nvSpPr>
         <p:spPr>
           <a:xfrm>
-            <a:off x="1821903" y="1940573"/>
-            <a:ext cx="8548194" cy="1446550"/>
+            <a:off x="216612" y="1753319"/>
+            <a:ext cx="11458151" cy="6001643"/>
           </a:xfrm>
           <a:prstGeom prst="rect">
             <a:avLst/>
@@ -19806,8 +19898,7 @@
           </a:bodyPr>
           <a:lstStyle/>
           <a:p>
-            <a:pPr defTabSz="457200"/>
-            <a:endParaRPr lang="en-US" sz="3200" b="1" dirty="0">
+            <a:endParaRPr lang="en-US" sz="2800" dirty="0">
               <a:solidFill>
                 <a:prstClr val="black"/>
               </a:solidFill>
@@ -19816,21 +19907,49 @@
             </a:endParaRPr>
           </a:p>
           <a:p>
-            <a:pPr marL="342900" indent="-342900" defTabSz="457200">
-              <a:buFont typeface="Arial" panose="020B0604020202020204" pitchFamily="34" charset="0"/>
-              <a:buChar char="•"/>
-            </a:pPr>
-            <a:r>
-              <a:rPr lang="en-US" sz="3200" b="1" dirty="0">
+            <a:r>
+              <a:rPr lang="en-US" sz="2800" dirty="0">
                 <a:solidFill>
                   <a:prstClr val="black"/>
                 </a:solidFill>
                 <a:latin typeface="Times New Roman" panose="02020603050405020304" pitchFamily="18" charset="0"/>
                 <a:cs typeface="Times New Roman" panose="02020603050405020304" pitchFamily="18" charset="0"/>
               </a:rPr>
-              <a:t>A</a:t>
-            </a:r>
-            <a:endParaRPr lang="en-US" sz="2400" dirty="0">
+              <a:t>1</a:t>
+            </a:r>
+            <a:r>
+              <a:rPr lang="en-US" sz="2800" dirty="0" smtClean="0">
+                <a:solidFill>
+                  <a:prstClr val="black"/>
+                </a:solidFill>
+                <a:latin typeface="Times New Roman" panose="02020603050405020304" pitchFamily="18" charset="0"/>
+                <a:cs typeface="Times New Roman" panose="02020603050405020304" pitchFamily="18" charset="0"/>
+              </a:rPr>
+              <a:t>) Figuring out how Open </a:t>
+            </a:r>
+            <a:r>
+              <a:rPr lang="en-US" sz="2800" dirty="0" err="1" smtClean="0">
+                <a:solidFill>
+                  <a:prstClr val="black"/>
+                </a:solidFill>
+                <a:latin typeface="Times New Roman" panose="02020603050405020304" pitchFamily="18" charset="0"/>
+                <a:cs typeface="Times New Roman" panose="02020603050405020304" pitchFamily="18" charset="0"/>
+              </a:rPr>
+              <a:t>virtex</a:t>
+            </a:r>
+            <a:r>
+              <a:rPr lang="en-US" sz="2800" dirty="0" smtClean="0">
+                <a:solidFill>
+                  <a:prstClr val="black"/>
+                </a:solidFill>
+                <a:latin typeface="Times New Roman" panose="02020603050405020304" pitchFamily="18" charset="0"/>
+                <a:cs typeface="Times New Roman" panose="02020603050405020304" pitchFamily="18" charset="0"/>
+              </a:rPr>
+              <a:t> stores its virtual topology database and extracting it.[Solved]</a:t>
+            </a:r>
+          </a:p>
+          <a:p>
+            <a:endParaRPr lang="en-US" sz="2800" dirty="0">
               <a:solidFill>
                 <a:prstClr val="black"/>
               </a:solidFill>
@@ -19839,8 +19958,7 @@
             </a:endParaRPr>
           </a:p>
           <a:p>
-            <a:pPr defTabSz="457200"/>
-            <a:endParaRPr lang="en-US" sz="2400" dirty="0">
+            <a:endParaRPr lang="en-US" sz="2800" dirty="0" smtClean="0">
               <a:solidFill>
                 <a:prstClr val="black"/>
               </a:solidFill>
@@ -19848,12 +19966,125 @@
               <a:cs typeface="Times New Roman" panose="02020603050405020304" pitchFamily="18" charset="0"/>
             </a:endParaRPr>
           </a:p>
+          <a:p>
+            <a:pPr defTabSz="457200"/>
+            <a:endParaRPr lang="en-US" sz="2800" dirty="0">
+              <a:solidFill>
+                <a:prstClr val="black"/>
+              </a:solidFill>
+              <a:latin typeface="Times New Roman" panose="02020603050405020304" pitchFamily="18" charset="0"/>
+              <a:cs typeface="Times New Roman" panose="02020603050405020304" pitchFamily="18" charset="0"/>
+            </a:endParaRPr>
+          </a:p>
+          <a:p>
+            <a:pPr defTabSz="457200"/>
+            <a:r>
+              <a:rPr lang="en-US" sz="2800" dirty="0" smtClean="0">
+                <a:solidFill>
+                  <a:prstClr val="black"/>
+                </a:solidFill>
+                <a:latin typeface="Times New Roman" panose="02020603050405020304" pitchFamily="18" charset="0"/>
+                <a:cs typeface="Times New Roman" panose="02020603050405020304" pitchFamily="18" charset="0"/>
+              </a:rPr>
+              <a:t>2)  </a:t>
+            </a:r>
+            <a:r>
+              <a:rPr lang="en-US" sz="2800" dirty="0">
+                <a:solidFill>
+                  <a:prstClr val="black"/>
+                </a:solidFill>
+                <a:latin typeface="Times New Roman" panose="02020603050405020304" pitchFamily="18" charset="0"/>
+                <a:cs typeface="Times New Roman" panose="02020603050405020304" pitchFamily="18" charset="0"/>
+              </a:rPr>
+              <a:t>Setting up environment to build java projects in custom Ubuntu Images like </a:t>
+            </a:r>
+            <a:r>
+              <a:rPr lang="en-US" sz="2800" dirty="0" err="1">
+                <a:solidFill>
+                  <a:prstClr val="black"/>
+                </a:solidFill>
+                <a:latin typeface="Times New Roman" panose="02020603050405020304" pitchFamily="18" charset="0"/>
+                <a:cs typeface="Times New Roman" panose="02020603050405020304" pitchFamily="18" charset="0"/>
+              </a:rPr>
+              <a:t>Openvirtex</a:t>
+            </a:r>
+            <a:r>
+              <a:rPr lang="en-US" sz="2800" dirty="0">
+                <a:solidFill>
+                  <a:prstClr val="black"/>
+                </a:solidFill>
+                <a:latin typeface="Times New Roman" panose="02020603050405020304" pitchFamily="18" charset="0"/>
+                <a:cs typeface="Times New Roman" panose="02020603050405020304" pitchFamily="18" charset="0"/>
+              </a:rPr>
+              <a:t> often result in errors. Run time errors are difficult to debug.</a:t>
+            </a:r>
+          </a:p>
+          <a:p>
+            <a:endParaRPr lang="en-US" sz="2000" dirty="0">
+              <a:solidFill>
+                <a:prstClr val="black"/>
+              </a:solidFill>
+              <a:latin typeface="Times New Roman" panose="02020603050405020304" pitchFamily="18" charset="0"/>
+              <a:cs typeface="Times New Roman" panose="02020603050405020304" pitchFamily="18" charset="0"/>
+            </a:endParaRPr>
+          </a:p>
+          <a:p>
+            <a:endParaRPr lang="en-US" sz="2000" dirty="0" smtClean="0">
+              <a:solidFill>
+                <a:prstClr val="black"/>
+              </a:solidFill>
+              <a:latin typeface="Times New Roman" panose="02020603050405020304" pitchFamily="18" charset="0"/>
+              <a:cs typeface="Times New Roman" panose="02020603050405020304" pitchFamily="18" charset="0"/>
+            </a:endParaRPr>
+          </a:p>
+          <a:p>
+            <a:endParaRPr lang="en-US" sz="2000" dirty="0">
+              <a:solidFill>
+                <a:prstClr val="black"/>
+              </a:solidFill>
+              <a:latin typeface="Times New Roman" panose="02020603050405020304" pitchFamily="18" charset="0"/>
+              <a:cs typeface="Times New Roman" panose="02020603050405020304" pitchFamily="18" charset="0"/>
+            </a:endParaRPr>
+          </a:p>
+          <a:p>
+            <a:endParaRPr lang="en-US" sz="2000" dirty="0" smtClean="0">
+              <a:solidFill>
+                <a:prstClr val="black"/>
+              </a:solidFill>
+              <a:latin typeface="Times New Roman" panose="02020603050405020304" pitchFamily="18" charset="0"/>
+              <a:cs typeface="Times New Roman" panose="02020603050405020304" pitchFamily="18" charset="0"/>
+            </a:endParaRPr>
+          </a:p>
+          <a:p>
+            <a:endParaRPr lang="en-US" sz="2000" dirty="0" smtClean="0">
+              <a:solidFill>
+                <a:prstClr val="black"/>
+              </a:solidFill>
+              <a:latin typeface="Times New Roman" panose="02020603050405020304" pitchFamily="18" charset="0"/>
+              <a:cs typeface="Times New Roman" panose="02020603050405020304" pitchFamily="18" charset="0"/>
+            </a:endParaRPr>
+          </a:p>
+          <a:p>
+            <a:endParaRPr lang="en-US" sz="2000" dirty="0" smtClean="0">
+              <a:solidFill>
+                <a:prstClr val="black"/>
+              </a:solidFill>
+              <a:latin typeface="Times New Roman" panose="02020603050405020304" pitchFamily="18" charset="0"/>
+              <a:cs typeface="Times New Roman" panose="02020603050405020304" pitchFamily="18" charset="0"/>
+            </a:endParaRPr>
+          </a:p>
+          <a:p>
+            <a:endParaRPr lang="en-US" sz="2000" dirty="0" smtClean="0"/>
+          </a:p>
+          <a:p>
+            <a:endParaRPr lang="en-US" sz="2000" dirty="0"/>
+          </a:p>
         </p:txBody>
       </p:sp>
     </p:spTree>
     <p:extLst>
       <p:ext uri="{BB962C8B-B14F-4D97-AF65-F5344CB8AC3E}">
-        <p14:creationId xmlns:p14="http://schemas.microsoft.com/office/powerpoint/2010/main" val="3977177271"/>
+        <p14:creationId xmlns:p14="http://schemas.microsoft.com/office/powerpoint/2010/main" val="51835465"/>
       </p:ext>
     </p:extLst>
   </p:cSld>
@@ -19914,7 +20145,14 @@
                 <a:latin typeface="Times New Roman"/>
                 <a:cs typeface="Times New Roman"/>
               </a:rPr>
-              <a:t>Demo</a:t>
+              <a:t>Problems </a:t>
+            </a:r>
+            <a:r>
+              <a:rPr lang="en-US" sz="4000" b="1" dirty="0" smtClean="0">
+                <a:latin typeface="Times New Roman"/>
+                <a:cs typeface="Times New Roman"/>
+              </a:rPr>
+              <a:t>We are still facing…</a:t>
             </a:r>
             <a:endParaRPr lang="en-US" sz="4000" b="1" dirty="0">
               <a:latin typeface="Times New Roman"/>
@@ -19923,10 +20161,278 @@
           </a:p>
         </p:txBody>
       </p:sp>
+      <p:sp>
+        <p:nvSpPr>
+          <p:cNvPr id="4" name="TextBox 3"/>
+          <p:cNvSpPr txBox="1"/>
+          <p:nvPr/>
+        </p:nvSpPr>
+        <p:spPr>
+          <a:xfrm>
+            <a:off x="606878" y="823586"/>
+            <a:ext cx="11186376" cy="7478970"/>
+          </a:xfrm>
+          <a:prstGeom prst="rect">
+            <a:avLst/>
+          </a:prstGeom>
+          <a:noFill/>
+        </p:spPr>
+        <p:txBody>
+          <a:bodyPr wrap="square" rtlCol="0">
+            <a:spAutoFit/>
+          </a:bodyPr>
+          <a:lstStyle/>
+          <a:p>
+            <a:pPr marL="457200" indent="-457200" defTabSz="457200">
+              <a:buAutoNum type="arabicParenR"/>
+            </a:pPr>
+            <a:endParaRPr lang="en-US" sz="2400" dirty="0" smtClean="0">
+              <a:solidFill>
+                <a:prstClr val="black"/>
+              </a:solidFill>
+              <a:latin typeface="Times New Roman" panose="02020603050405020304" pitchFamily="18" charset="0"/>
+              <a:cs typeface="Times New Roman" panose="02020603050405020304" pitchFamily="18" charset="0"/>
+            </a:endParaRPr>
+          </a:p>
+          <a:p>
+            <a:pPr marL="457200" indent="-457200" defTabSz="457200">
+              <a:buAutoNum type="arabicParenR"/>
+            </a:pPr>
+            <a:endParaRPr lang="en-US" sz="2400" dirty="0">
+              <a:solidFill>
+                <a:prstClr val="black"/>
+              </a:solidFill>
+              <a:latin typeface="Times New Roman" panose="02020603050405020304" pitchFamily="18" charset="0"/>
+              <a:cs typeface="Times New Roman" panose="02020603050405020304" pitchFamily="18" charset="0"/>
+            </a:endParaRPr>
+          </a:p>
+          <a:p>
+            <a:pPr marL="457200" indent="-457200" defTabSz="457200">
+              <a:buAutoNum type="arabicParenR"/>
+            </a:pPr>
+            <a:r>
+              <a:rPr lang="en-US" sz="2400" dirty="0" smtClean="0">
+                <a:solidFill>
+                  <a:prstClr val="black"/>
+                </a:solidFill>
+                <a:latin typeface="Times New Roman" panose="02020603050405020304" pitchFamily="18" charset="0"/>
+                <a:cs typeface="Times New Roman" panose="02020603050405020304" pitchFamily="18" charset="0"/>
+              </a:rPr>
+              <a:t>Designing and implementing a protocol that automatically communicates the virtual topology database(OVX DB) is a big challenge within this limited time range. </a:t>
+            </a:r>
+          </a:p>
+          <a:p>
+            <a:pPr marL="457200" indent="-457200" defTabSz="457200">
+              <a:buAutoNum type="arabicParenR"/>
+            </a:pPr>
+            <a:endParaRPr lang="en-US" sz="2400" dirty="0" smtClean="0">
+              <a:solidFill>
+                <a:prstClr val="black"/>
+              </a:solidFill>
+              <a:latin typeface="Times New Roman" panose="02020603050405020304" pitchFamily="18" charset="0"/>
+              <a:cs typeface="Times New Roman" panose="02020603050405020304" pitchFamily="18" charset="0"/>
+            </a:endParaRPr>
+          </a:p>
+          <a:p>
+            <a:pPr marL="342900" indent="-342900">
+              <a:buAutoNum type="arabicParenR"/>
+            </a:pPr>
+            <a:r>
+              <a:rPr lang="en-US" sz="2400" dirty="0"/>
+              <a:t>Trying to setup environment with Ubuntu images. The project required setting up 7 Virtual Machines each for</a:t>
+            </a:r>
+          </a:p>
+          <a:p>
+            <a:r>
+              <a:rPr lang="en-US" sz="2400" dirty="0"/>
+              <a:t>-4 Controllers(to represent 2 IaaS providers)</a:t>
+            </a:r>
+          </a:p>
+          <a:p>
+            <a:r>
+              <a:rPr lang="en-US" sz="2400" dirty="0"/>
+              <a:t>-2 OVX instances</a:t>
+            </a:r>
+          </a:p>
+          <a:p>
+            <a:r>
+              <a:rPr lang="en-US" sz="2400" dirty="0"/>
+              <a:t>-1 </a:t>
+            </a:r>
+            <a:r>
+              <a:rPr lang="en-US" sz="2400" dirty="0" err="1"/>
+              <a:t>Mininet</a:t>
+            </a:r>
+            <a:endParaRPr lang="en-US" sz="2400" dirty="0"/>
+          </a:p>
+          <a:p>
+            <a:r>
+              <a:rPr lang="en-US" sz="2400" dirty="0"/>
+              <a:t> </a:t>
+            </a:r>
+            <a:r>
+              <a:rPr lang="en-US" sz="2400" dirty="0">
+                <a:solidFill>
+                  <a:prstClr val="black"/>
+                </a:solidFill>
+                <a:latin typeface="Times New Roman" panose="02020603050405020304" pitchFamily="18" charset="0"/>
+                <a:cs typeface="Times New Roman" panose="02020603050405020304" pitchFamily="18" charset="0"/>
+              </a:rPr>
+              <a:t>Need to set up 7 virtual machines takes lot of memory and storage and laptop often gets very slowed down </a:t>
+            </a:r>
+            <a:r>
+              <a:rPr lang="en-US" sz="2400" dirty="0" smtClean="0">
+                <a:solidFill>
+                  <a:prstClr val="black"/>
+                </a:solidFill>
+                <a:latin typeface="Times New Roman" panose="02020603050405020304" pitchFamily="18" charset="0"/>
+                <a:cs typeface="Times New Roman" panose="02020603050405020304" pitchFamily="18" charset="0"/>
+              </a:rPr>
+              <a:t>and </a:t>
+            </a:r>
+            <a:r>
+              <a:rPr lang="en-US" sz="2400" dirty="0">
+                <a:solidFill>
+                  <a:prstClr val="black"/>
+                </a:solidFill>
+                <a:latin typeface="Times New Roman" panose="02020603050405020304" pitchFamily="18" charset="0"/>
+                <a:cs typeface="Times New Roman" panose="02020603050405020304" pitchFamily="18" charset="0"/>
+              </a:rPr>
+              <a:t>starts giving weird errors</a:t>
+            </a:r>
+            <a:r>
+              <a:rPr lang="en-US" sz="2400" dirty="0" smtClean="0">
+                <a:solidFill>
+                  <a:prstClr val="black"/>
+                </a:solidFill>
+                <a:latin typeface="Times New Roman" panose="02020603050405020304" pitchFamily="18" charset="0"/>
+                <a:cs typeface="Times New Roman" panose="02020603050405020304" pitchFamily="18" charset="0"/>
+              </a:rPr>
+              <a:t>.</a:t>
+            </a:r>
+          </a:p>
+          <a:p>
+            <a:endParaRPr lang="en-US" sz="2400" dirty="0">
+              <a:solidFill>
+                <a:prstClr val="black"/>
+              </a:solidFill>
+              <a:latin typeface="Times New Roman" panose="02020603050405020304" pitchFamily="18" charset="0"/>
+              <a:cs typeface="Times New Roman" panose="02020603050405020304" pitchFamily="18" charset="0"/>
+            </a:endParaRPr>
+          </a:p>
+          <a:p>
+            <a:pPr defTabSz="457200"/>
+            <a:r>
+              <a:rPr lang="en-US" sz="2400" dirty="0" smtClean="0">
+                <a:solidFill>
+                  <a:prstClr val="black"/>
+                </a:solidFill>
+                <a:latin typeface="Times New Roman" panose="02020603050405020304" pitchFamily="18" charset="0"/>
+                <a:cs typeface="Times New Roman" panose="02020603050405020304" pitchFamily="18" charset="0"/>
+              </a:rPr>
+              <a:t>3</a:t>
+            </a:r>
+            <a:r>
+              <a:rPr lang="en-US" sz="2400" dirty="0">
+                <a:solidFill>
+                  <a:prstClr val="black"/>
+                </a:solidFill>
+                <a:latin typeface="Times New Roman" panose="02020603050405020304" pitchFamily="18" charset="0"/>
+                <a:cs typeface="Times New Roman" panose="02020603050405020304" pitchFamily="18" charset="0"/>
+              </a:rPr>
+              <a:t>) </a:t>
+            </a:r>
+            <a:r>
+              <a:rPr lang="en-US" sz="2400" dirty="0" smtClean="0">
+                <a:solidFill>
+                  <a:prstClr val="black"/>
+                </a:solidFill>
+                <a:latin typeface="Times New Roman" panose="02020603050405020304" pitchFamily="18" charset="0"/>
+                <a:cs typeface="Times New Roman" panose="02020603050405020304" pitchFamily="18" charset="0"/>
+              </a:rPr>
+              <a:t> Open </a:t>
+            </a:r>
+            <a:r>
+              <a:rPr lang="en-US" sz="2400" dirty="0" err="1">
+                <a:solidFill>
+                  <a:prstClr val="black"/>
+                </a:solidFill>
+                <a:latin typeface="Times New Roman" panose="02020603050405020304" pitchFamily="18" charset="0"/>
+                <a:cs typeface="Times New Roman" panose="02020603050405020304" pitchFamily="18" charset="0"/>
+              </a:rPr>
+              <a:t>virtex</a:t>
+            </a:r>
+            <a:r>
+              <a:rPr lang="en-US" sz="2400" dirty="0">
+                <a:solidFill>
+                  <a:prstClr val="black"/>
+                </a:solidFill>
+                <a:latin typeface="Times New Roman" panose="02020603050405020304" pitchFamily="18" charset="0"/>
+                <a:cs typeface="Times New Roman" panose="02020603050405020304" pitchFamily="18" charset="0"/>
+              </a:rPr>
+              <a:t> is not very good with its documentation and has lot of unpredictable errors. [Not Solved]</a:t>
+            </a:r>
+          </a:p>
+          <a:p>
+            <a:pPr marL="457200" indent="-457200" defTabSz="457200">
+              <a:buAutoNum type="arabicParenR"/>
+            </a:pPr>
+            <a:endParaRPr lang="en-US" sz="2400" dirty="0" smtClean="0">
+              <a:solidFill>
+                <a:prstClr val="black"/>
+              </a:solidFill>
+              <a:latin typeface="Times New Roman" panose="02020603050405020304" pitchFamily="18" charset="0"/>
+              <a:cs typeface="Times New Roman" panose="02020603050405020304" pitchFamily="18" charset="0"/>
+            </a:endParaRPr>
+          </a:p>
+          <a:p>
+            <a:pPr defTabSz="457200"/>
+            <a:endParaRPr lang="en-US" sz="2400" dirty="0" smtClean="0">
+              <a:solidFill>
+                <a:prstClr val="black"/>
+              </a:solidFill>
+              <a:latin typeface="Times New Roman" panose="02020603050405020304" pitchFamily="18" charset="0"/>
+              <a:cs typeface="Times New Roman" panose="02020603050405020304" pitchFamily="18" charset="0"/>
+            </a:endParaRPr>
+          </a:p>
+          <a:p>
+            <a:pPr marL="457200" indent="-457200" defTabSz="457200">
+              <a:buAutoNum type="arabicParenR"/>
+            </a:pPr>
+            <a:endParaRPr lang="en-US" sz="2400" dirty="0">
+              <a:solidFill>
+                <a:prstClr val="black"/>
+              </a:solidFill>
+              <a:latin typeface="Times New Roman" panose="02020603050405020304" pitchFamily="18" charset="0"/>
+              <a:cs typeface="Times New Roman" panose="02020603050405020304" pitchFamily="18" charset="0"/>
+            </a:endParaRPr>
+          </a:p>
+          <a:p>
+            <a:pPr defTabSz="457200"/>
+            <a:endParaRPr lang="en-US" sz="2400" dirty="0" smtClean="0">
+              <a:solidFill>
+                <a:prstClr val="black"/>
+              </a:solidFill>
+              <a:latin typeface="Times New Roman" panose="02020603050405020304" pitchFamily="18" charset="0"/>
+              <a:cs typeface="Times New Roman" panose="02020603050405020304" pitchFamily="18" charset="0"/>
+            </a:endParaRPr>
+          </a:p>
+          <a:p>
+            <a:pPr defTabSz="457200"/>
+            <a:endParaRPr lang="en-US" sz="2400" dirty="0" smtClean="0">
+              <a:solidFill>
+                <a:prstClr val="black"/>
+              </a:solidFill>
+              <a:latin typeface="Times New Roman" panose="02020603050405020304" pitchFamily="18" charset="0"/>
+              <a:cs typeface="Times New Roman" panose="02020603050405020304" pitchFamily="18" charset="0"/>
+            </a:endParaRPr>
+          </a:p>
+        </p:txBody>
+      </p:sp>
     </p:spTree>
     <p:extLst>
       <p:ext uri="{BB962C8B-B14F-4D97-AF65-F5344CB8AC3E}">
-        <p14:creationId xmlns:p14="http://schemas.microsoft.com/office/powerpoint/2010/main" val="3027585494"/>
+        <p14:creationId xmlns:p14="http://schemas.microsoft.com/office/powerpoint/2010/main" val="3977177271"/>
       </p:ext>
     </p:extLst>
   </p:cSld>
@@ -19987,7 +20493,7 @@
                 <a:latin typeface="Times New Roman"/>
                 <a:cs typeface="Times New Roman"/>
               </a:rPr>
-              <a:t>Burndown Chart</a:t>
+              <a:t>Demo</a:t>
             </a:r>
             <a:endParaRPr lang="en-US" sz="4000" b="1" dirty="0">
               <a:latin typeface="Times New Roman"/>
@@ -19996,39 +20502,10 @@
           </a:p>
         </p:txBody>
       </p:sp>
-      <p:pic>
-        <p:nvPicPr>
-          <p:cNvPr id="3" name="Picture 2"/>
-          <p:cNvPicPr>
-            <a:picLocks noChangeAspect="1"/>
-          </p:cNvPicPr>
-          <p:nvPr/>
-        </p:nvPicPr>
-        <p:blipFill rotWithShape="1">
-          <a:blip r:embed="rId2">
-            <a:extLst>
-              <a:ext uri="{28A0092B-C50C-407E-A947-70E740481C1C}">
-                <a14:useLocalDpi xmlns:a14="http://schemas.microsoft.com/office/drawing/2010/main" val="0"/>
-              </a:ext>
-            </a:extLst>
-          </a:blip>
-          <a:srcRect l="463" r="1995"/>
-          <a:stretch/>
-        </p:blipFill>
-        <p:spPr>
-          <a:xfrm>
-            <a:off x="1117361" y="1395663"/>
-            <a:ext cx="9957278" cy="4995512"/>
-          </a:xfrm>
-          <a:prstGeom prst="rect">
-            <a:avLst/>
-          </a:prstGeom>
-        </p:spPr>
-      </p:pic>
     </p:spTree>
     <p:extLst>
       <p:ext uri="{BB962C8B-B14F-4D97-AF65-F5344CB8AC3E}">
-        <p14:creationId xmlns:p14="http://schemas.microsoft.com/office/powerpoint/2010/main" val="2212017346"/>
+        <p14:creationId xmlns:p14="http://schemas.microsoft.com/office/powerpoint/2010/main" val="3027585494"/>
       </p:ext>
     </p:extLst>
   </p:cSld>
@@ -20074,32 +20551,58 @@
         </p:nvSpPr>
         <p:spPr>
           <a:xfrm>
-            <a:off x="1981200" y="2857500"/>
-            <a:ext cx="8229600" cy="1143000"/>
-          </a:xfrm>
-        </p:spPr>
-        <p:txBody>
-          <a:bodyPr/>
-          <a:lstStyle/>
-          <a:p>
-            <a:r>
-              <a:rPr lang="en-US" b="1" dirty="0" smtClean="0">
-                <a:latin typeface="Times New Roman" panose="02020603050405020304" pitchFamily="18" charset="0"/>
-                <a:cs typeface="Times New Roman" panose="02020603050405020304" pitchFamily="18" charset="0"/>
+            <a:off x="0" y="0"/>
+            <a:ext cx="12192000" cy="1143000"/>
+          </a:xfrm>
+        </p:spPr>
+        <p:txBody>
+          <a:bodyPr>
+            <a:normAutofit/>
+          </a:bodyPr>
+          <a:lstStyle/>
+          <a:p>
+            <a:r>
+              <a:rPr lang="en-US" sz="4000" b="1" dirty="0" smtClean="0">
+                <a:latin typeface="Times New Roman"/>
+                <a:cs typeface="Times New Roman"/>
               </a:rPr>
-              <a:t>Questions?</a:t>
-            </a:r>
-            <a:endParaRPr lang="en-US" b="1" dirty="0">
-              <a:latin typeface="Times New Roman" panose="02020603050405020304" pitchFamily="18" charset="0"/>
-              <a:cs typeface="Times New Roman" panose="02020603050405020304" pitchFamily="18" charset="0"/>
+              <a:t>Burndown Chart</a:t>
+            </a:r>
+            <a:endParaRPr lang="en-US" sz="4000" b="1" dirty="0">
+              <a:latin typeface="Times New Roman"/>
+              <a:cs typeface="Times New Roman"/>
             </a:endParaRPr>
           </a:p>
         </p:txBody>
       </p:sp>
+      <p:pic>
+        <p:nvPicPr>
+          <p:cNvPr id="4" name="Picture 3"/>
+          <p:cNvPicPr>
+            <a:picLocks noChangeAspect="1"/>
+          </p:cNvPicPr>
+          <p:nvPr/>
+        </p:nvPicPr>
+        <p:blipFill>
+          <a:blip r:embed="rId2"/>
+          <a:stretch>
+            <a:fillRect/>
+          </a:stretch>
+        </p:blipFill>
+        <p:spPr>
+          <a:xfrm>
+            <a:off x="817123" y="876416"/>
+            <a:ext cx="10590179" cy="5844845"/>
+          </a:xfrm>
+          <a:prstGeom prst="rect">
+            <a:avLst/>
+          </a:prstGeom>
+        </p:spPr>
+      </p:pic>
     </p:spTree>
     <p:extLst>
       <p:ext uri="{BB962C8B-B14F-4D97-AF65-F5344CB8AC3E}">
-        <p14:creationId xmlns:p14="http://schemas.microsoft.com/office/powerpoint/2010/main" val="4022118759"/>
+        <p14:creationId xmlns:p14="http://schemas.microsoft.com/office/powerpoint/2010/main" val="2212017346"/>
       </p:ext>
     </p:extLst>
   </p:cSld>

</xml_diff>